<commit_message>
added course blocks and seminar slides
</commit_message>
<xml_diff>
--- a/quantum-courses/quantum-course-blocks.pptx
+++ b/quantum-courses/quantum-course-blocks.pptx
@@ -1699,7 +1699,7 @@
           </a:bodyPr>
           <a:p>
             <a:pPr algn="r"/>
-            <a:fld id="{F82A85C7-C019-4BBF-823F-09171F559D58}" type="slidenum">
+            <a:fld id="{9513013D-6B81-425D-83B1-AA6C7FDDA524}" type="slidenum">
               <a:rPr b="0" lang="en-US" sz="1400" spc="-1" strike="noStrike">
                 <a:latin typeface="Times New Roman"/>
               </a:rPr>
@@ -2193,13 +2193,7 @@
               <a:rPr b="0" lang="en-US" sz="1800" spc="-1" strike="noStrike">
                 <a:latin typeface="Arial"/>
               </a:rPr>
-              <a:t>Core 1-year </a:t>
-            </a:r>
-            <a:r>
-              <a:rPr b="0" lang="en-US" sz="1800" spc="-1" strike="noStrike">
-                <a:latin typeface="Arial"/>
-              </a:rPr>
-              <a:t>Requirement</a:t>
+              <a:t>Core 1-year Requirement</a:t>
             </a:r>
             <a:endParaRPr b="0" lang="en-US" sz="1800" spc="-1" strike="noStrike">
               <a:latin typeface="Arial"/>
@@ -2682,57 +2676,9 @@
                 </a:solidFill>
                 <a:latin typeface="Arial"/>
               </a:rPr>
-              <a:t>Q</a:t>
-            </a:r>
-            <a:r>
-              <a:rPr b="0" lang="en-US" sz="1800" spc="-1" strike="noStrike">
-                <a:solidFill>
-                  <a:srgbClr val="0000ff"/>
-                </a:solidFill>
-                <a:latin typeface="Arial"/>
-              </a:rPr>
-              <a:t>M</a:t>
-            </a:r>
-            <a:r>
-              <a:rPr b="0" lang="en-US" sz="1800" spc="-1" strike="noStrike">
-                <a:solidFill>
-                  <a:srgbClr val="0000ff"/>
-                </a:solidFill>
-                <a:latin typeface="Arial"/>
-              </a:rPr>
-              <a:t> </a:t>
-            </a:r>
-            <a:r>
-              <a:rPr b="0" lang="en-US" sz="1800" spc="-1" strike="noStrike">
-                <a:solidFill>
-                  <a:srgbClr val="0000ff"/>
-                </a:solidFill>
-                <a:latin typeface="Arial"/>
-              </a:rPr>
-              <a:t>L</a:t>
-            </a:r>
-            <a:r>
-              <a:rPr b="0" lang="en-US" sz="1800" spc="-1" strike="noStrike">
-                <a:solidFill>
-                  <a:srgbClr val="0000ff"/>
-                </a:solidFill>
-                <a:latin typeface="Arial"/>
-              </a:rPr>
-              <a:t>a</a:t>
-            </a:r>
-            <a:r>
-              <a:rPr b="0" lang="en-US" sz="1800" spc="-1" strike="noStrike">
-                <a:solidFill>
-                  <a:srgbClr val="0000ff"/>
-                </a:solidFill>
-                <a:latin typeface="Arial"/>
-              </a:rPr>
-              <a:t>b</a:t>
+              <a:t>QM Lab 2</a:t>
             </a:r>
             <a:endParaRPr b="0" lang="en-US" sz="1800" spc="-1" strike="noStrike">
-              <a:solidFill>
-                <a:srgbClr val="0000ff"/>
-              </a:solidFill>
               <a:latin typeface="Arial"/>
             </a:endParaRPr>
           </a:p>
@@ -2805,9 +2751,6 @@
               <a:t>QKD Lab</a:t>
             </a:r>
             <a:endParaRPr b="0" lang="en-US" sz="1800" spc="-1" strike="noStrike">
-              <a:solidFill>
-                <a:srgbClr val="0000ff"/>
-              </a:solidFill>
               <a:latin typeface="Arial"/>
             </a:endParaRPr>
           </a:p>
@@ -2880,9 +2823,6 @@
               <a:t>Q-Sensing Lab</a:t>
             </a:r>
             <a:endParaRPr b="0" lang="en-US" sz="1800" spc="-1" strike="noStrike">
-              <a:solidFill>
-                <a:srgbClr val="0000ff"/>
-              </a:solidFill>
               <a:latin typeface="Arial"/>
             </a:endParaRPr>
           </a:p>
@@ -2955,9 +2895,6 @@
               <a:t>FPGA Lab I</a:t>
             </a:r>
             <a:endParaRPr b="0" lang="en-US" sz="1800" spc="-1" strike="noStrike">
-              <a:solidFill>
-                <a:srgbClr val="0000ff"/>
-              </a:solidFill>
               <a:latin typeface="Arial"/>
             </a:endParaRPr>
           </a:p>
@@ -3030,9 +2967,6 @@
               <a:t>FPGA Lab II</a:t>
             </a:r>
             <a:endParaRPr b="0" lang="en-US" sz="1800" spc="-1" strike="noStrike">
-              <a:solidFill>
-                <a:srgbClr val="0000ff"/>
-              </a:solidFill>
               <a:latin typeface="Arial"/>
             </a:endParaRPr>
           </a:p>
@@ -3047,6 +2981,78 @@
         <p:spPr>
           <a:xfrm>
             <a:off x="6841440" y="5356800"/>
+            <a:ext cx="822960" cy="0"/>
+          </a:xfrm>
+          <a:prstGeom prst="line">
+            <a:avLst/>
+          </a:prstGeom>
+          <a:ln w="0">
+            <a:solidFill>
+              <a:srgbClr val="3465a4"/>
+            </a:solidFill>
+            <a:headEnd len="med" type="triangle" w="med"/>
+            <a:tailEnd len="med" type="triangle" w="med"/>
+          </a:ln>
+        </p:spPr>
+        <p:style>
+          <a:lnRef idx="0"/>
+          <a:fillRef idx="0"/>
+          <a:effectRef idx="0"/>
+          <a:fontRef idx="minor"/>
+        </p:style>
+      </p:sp>
+      <p:sp>
+        <p:nvSpPr>
+          <p:cNvPr id="77" name="TextShape 37"/>
+          <p:cNvSpPr txBox="1"/>
+          <p:nvPr/>
+        </p:nvSpPr>
+        <p:spPr>
+          <a:xfrm>
+            <a:off x="6368400" y="950400"/>
+            <a:ext cx="2057400" cy="364320"/>
+          </a:xfrm>
+          <a:prstGeom prst="rect">
+            <a:avLst/>
+          </a:prstGeom>
+          <a:noFill/>
+          <a:ln w="18360">
+            <a:solidFill>
+              <a:srgbClr val="0000ff"/>
+            </a:solidFill>
+            <a:round/>
+          </a:ln>
+        </p:spPr>
+        <p:txBody>
+          <a:bodyPr lIns="99000" rIns="99000" tIns="54000" bIns="54000">
+            <a:noAutofit/>
+          </a:bodyPr>
+          <a:p>
+            <a:pPr algn="ctr"/>
+            <a:r>
+              <a:rPr b="0" lang="en-US" sz="1800" spc="-1" strike="noStrike">
+                <a:solidFill>
+                  <a:srgbClr val="0000ff"/>
+                </a:solidFill>
+                <a:latin typeface="Arial"/>
+              </a:rPr>
+              <a:t>QM Lab 1</a:t>
+            </a:r>
+            <a:endParaRPr b="0" lang="en-US" sz="1800" spc="-1" strike="noStrike">
+              <a:latin typeface="Arial"/>
+            </a:endParaRPr>
+          </a:p>
+        </p:txBody>
+      </p:sp>
+      <p:sp>
+        <p:nvSpPr>
+          <p:cNvPr id="78" name="Line 38"/>
+          <p:cNvSpPr/>
+          <p:nvPr/>
+        </p:nvSpPr>
+        <p:spPr>
+          <a:xfrm>
+            <a:off x="5545440" y="1144800"/>
             <a:ext cx="822960" cy="0"/>
           </a:xfrm>
           <a:prstGeom prst="line">

</xml_diff>

<commit_message>
added lab template and pics
</commit_message>
<xml_diff>
--- a/quantum-courses/quantum-course-blocks.pptx
+++ b/quantum-courses/quantum-course-blocks.pptx
@@ -2757,7 +2757,7 @@
         <p:spPr>
           <a:xfrm>
             <a:off x="504000" y="226080"/>
-            <a:ext cx="9070920" cy="945720"/>
+            <a:ext cx="9072000" cy="946440"/>
           </a:xfrm>
           <a:prstGeom prst="rect">
             <a:avLst/>
@@ -2768,13 +2768,38 @@
             <a:noAutofit/>
           </a:bodyPr>
           <a:p>
+            <a:pPr algn="ctr"/>
             <a:r>
-              <a:rPr b="0" lang="en-US" sz="1800" spc="-1" strike="noStrike">
+              <a:rPr b="0" lang="en-US" sz="4400" spc="-1" strike="noStrike">
                 <a:latin typeface="Arial"/>
               </a:rPr>
-              <a:t>Click to edit the title text format</a:t>
+              <a:t>Click to </a:t>
             </a:r>
-            <a:endParaRPr b="0" lang="en-US" sz="1800" spc="-1" strike="noStrike">
+            <a:r>
+              <a:rPr b="0" lang="en-US" sz="4400" spc="-1" strike="noStrike">
+                <a:latin typeface="Arial"/>
+              </a:rPr>
+              <a:t>edit the </a:t>
+            </a:r>
+            <a:r>
+              <a:rPr b="0" lang="en-US" sz="4400" spc="-1" strike="noStrike">
+                <a:latin typeface="Arial"/>
+              </a:rPr>
+              <a:t>title </a:t>
+            </a:r>
+            <a:r>
+              <a:rPr b="0" lang="en-US" sz="4400" spc="-1" strike="noStrike">
+                <a:latin typeface="Arial"/>
+              </a:rPr>
+              <a:t>text </a:t>
+            </a:r>
+            <a:r>
+              <a:rPr b="0" lang="en-US" sz="4400" spc="-1" strike="noStrike">
+                <a:latin typeface="Arial"/>
+              </a:rPr>
+              <a:t>format</a:t>
+            </a:r>
+            <a:endParaRPr b="0" lang="en-US" sz="4400" spc="-1" strike="noStrike">
               <a:latin typeface="Arial"/>
             </a:endParaRPr>
           </a:p>
@@ -2793,7 +2818,7 @@
         <p:spPr>
           <a:xfrm>
             <a:off x="504000" y="1326600"/>
-            <a:ext cx="9071640" cy="3288240"/>
+            <a:ext cx="9072000" cy="3288600"/>
           </a:xfrm>
           <a:prstGeom prst="rect">
             <a:avLst/>
@@ -2816,12 +2841,12 @@
               <a:buChar char=""/>
             </a:pPr>
             <a:r>
-              <a:rPr b="0" lang="en-US" sz="1800" spc="-1" strike="noStrike">
+              <a:rPr b="0" lang="en-US" sz="3200" spc="-1" strike="noStrike">
                 <a:latin typeface="Arial"/>
               </a:rPr>
               <a:t>Click to edit the outline text format</a:t>
             </a:r>
-            <a:endParaRPr b="0" lang="en-US" sz="1800" spc="-1" strike="noStrike">
+            <a:endParaRPr b="0" lang="en-US" sz="3200" spc="-1" strike="noStrike">
               <a:latin typeface="Arial"/>
             </a:endParaRPr>
           </a:p>
@@ -2838,12 +2863,12 @@
               <a:buChar char=""/>
             </a:pPr>
             <a:r>
-              <a:rPr b="0" lang="en-US" sz="1800" spc="-1" strike="noStrike">
+              <a:rPr b="0" lang="en-US" sz="2800" spc="-1" strike="noStrike">
                 <a:latin typeface="Arial"/>
               </a:rPr>
               <a:t>Second Outline Level</a:t>
             </a:r>
-            <a:endParaRPr b="0" lang="en-US" sz="1800" spc="-1" strike="noStrike">
+            <a:endParaRPr b="0" lang="en-US" sz="2800" spc="-1" strike="noStrike">
               <a:latin typeface="Arial"/>
             </a:endParaRPr>
           </a:p>
@@ -2860,12 +2885,12 @@
               <a:buChar char=""/>
             </a:pPr>
             <a:r>
-              <a:rPr b="0" lang="en-US" sz="1800" spc="-1" strike="noStrike">
+              <a:rPr b="0" lang="en-US" sz="2400" spc="-1" strike="noStrike">
                 <a:latin typeface="Arial"/>
               </a:rPr>
               <a:t>Third Outline Level</a:t>
             </a:r>
-            <a:endParaRPr b="0" lang="en-US" sz="1800" spc="-1" strike="noStrike">
+            <a:endParaRPr b="0" lang="en-US" sz="2400" spc="-1" strike="noStrike">
               <a:latin typeface="Arial"/>
             </a:endParaRPr>
           </a:p>
@@ -2882,12 +2907,12 @@
               <a:buChar char=""/>
             </a:pPr>
             <a:r>
-              <a:rPr b="0" lang="en-US" sz="1800" spc="-1" strike="noStrike">
+              <a:rPr b="0" lang="en-US" sz="2000" spc="-1" strike="noStrike">
                 <a:latin typeface="Arial"/>
               </a:rPr>
               <a:t>Fourth Outline Level</a:t>
             </a:r>
-            <a:endParaRPr b="0" lang="en-US" sz="1800" spc="-1" strike="noStrike">
+            <a:endParaRPr b="0" lang="en-US" sz="2000" spc="-1" strike="noStrike">
               <a:latin typeface="Arial"/>
             </a:endParaRPr>
           </a:p>
@@ -2904,12 +2929,12 @@
               <a:buChar char=""/>
             </a:pPr>
             <a:r>
-              <a:rPr b="0" lang="en-US" sz="1800" spc="-1" strike="noStrike">
+              <a:rPr b="0" lang="en-US" sz="2000" spc="-1" strike="noStrike">
                 <a:latin typeface="Arial"/>
               </a:rPr>
               <a:t>Fifth Outline Level</a:t>
             </a:r>
-            <a:endParaRPr b="0" lang="en-US" sz="1800" spc="-1" strike="noStrike">
+            <a:endParaRPr b="0" lang="en-US" sz="2000" spc="-1" strike="noStrike">
               <a:latin typeface="Arial"/>
             </a:endParaRPr>
           </a:p>
@@ -2926,12 +2951,12 @@
               <a:buChar char=""/>
             </a:pPr>
             <a:r>
-              <a:rPr b="0" lang="en-US" sz="1800" spc="-1" strike="noStrike">
+              <a:rPr b="0" lang="en-US" sz="2000" spc="-1" strike="noStrike">
                 <a:latin typeface="Arial"/>
               </a:rPr>
               <a:t>Sixth Outline Level</a:t>
             </a:r>
-            <a:endParaRPr b="0" lang="en-US" sz="1800" spc="-1" strike="noStrike">
+            <a:endParaRPr b="0" lang="en-US" sz="2000" spc="-1" strike="noStrike">
               <a:latin typeface="Arial"/>
             </a:endParaRPr>
           </a:p>
@@ -2948,12 +2973,12 @@
               <a:buChar char=""/>
             </a:pPr>
             <a:r>
-              <a:rPr b="0" lang="en-US" sz="1800" spc="-1" strike="noStrike">
+              <a:rPr b="0" lang="en-US" sz="2000" spc="-1" strike="noStrike">
                 <a:latin typeface="Arial"/>
               </a:rPr>
               <a:t>Seventh Outline Level</a:t>
             </a:r>
-            <a:endParaRPr b="0" lang="en-US" sz="1800" spc="-1" strike="noStrike">
+            <a:endParaRPr b="0" lang="en-US" sz="2000" spc="-1" strike="noStrike">
               <a:latin typeface="Arial"/>
             </a:endParaRPr>
           </a:p>
@@ -3083,7 +3108,7 @@
           <a:p>
             <a:pPr marL="432000" indent="-324000">
               <a:spcBef>
-                <a:spcPts val="1414"/>
+                <a:spcPts val="1417"/>
               </a:spcBef>
               <a:buClr>
                 <a:srgbClr val="000000"/>
@@ -3282,7 +3307,7 @@
         <p:spPr>
           <a:xfrm>
             <a:off x="0" y="0"/>
-            <a:ext cx="4524480" cy="312120"/>
+            <a:ext cx="4524120" cy="311760"/>
           </a:xfrm>
           <a:prstGeom prst="rect">
             <a:avLst/>
@@ -3333,7 +3358,7 @@
         <p:spPr>
           <a:xfrm>
             <a:off x="3483000" y="986400"/>
-            <a:ext cx="2056680" cy="363600"/>
+            <a:ext cx="2056320" cy="363240"/>
           </a:xfrm>
           <a:prstGeom prst="rect">
             <a:avLst/>
@@ -3387,7 +3412,7 @@
         <p:spPr>
           <a:xfrm>
             <a:off x="3483000" y="1672200"/>
-            <a:ext cx="2056680" cy="363600"/>
+            <a:ext cx="2056320" cy="363240"/>
           </a:xfrm>
           <a:prstGeom prst="rect">
             <a:avLst/>
@@ -3441,7 +3466,7 @@
         <p:spPr>
           <a:xfrm>
             <a:off x="685800" y="3078000"/>
-            <a:ext cx="2056680" cy="363600"/>
+            <a:ext cx="2056320" cy="363240"/>
           </a:xfrm>
           <a:prstGeom prst="rect">
             <a:avLst/>
@@ -3495,7 +3520,7 @@
         <p:spPr>
           <a:xfrm>
             <a:off x="685800" y="3763800"/>
-            <a:ext cx="2056680" cy="363600"/>
+            <a:ext cx="2056320" cy="363240"/>
           </a:xfrm>
           <a:prstGeom prst="rect">
             <a:avLst/>
@@ -3549,7 +3574,7 @@
         <p:spPr>
           <a:xfrm>
             <a:off x="685800" y="4449600"/>
-            <a:ext cx="2056680" cy="363600"/>
+            <a:ext cx="2056320" cy="363240"/>
           </a:xfrm>
           <a:prstGeom prst="rect">
             <a:avLst/>
@@ -3603,7 +3628,7 @@
         <p:spPr>
           <a:xfrm>
             <a:off x="4770000" y="3054600"/>
-            <a:ext cx="2056680" cy="363600"/>
+            <a:ext cx="2056320" cy="363240"/>
           </a:xfrm>
           <a:prstGeom prst="rect">
             <a:avLst/>
@@ -3657,7 +3682,7 @@
         <p:spPr>
           <a:xfrm>
             <a:off x="4770000" y="3740400"/>
-            <a:ext cx="2056680" cy="363600"/>
+            <a:ext cx="2056320" cy="363240"/>
           </a:xfrm>
           <a:prstGeom prst="rect">
             <a:avLst/>
@@ -3711,7 +3736,7 @@
         <p:spPr>
           <a:xfrm>
             <a:off x="685800" y="5135400"/>
-            <a:ext cx="2056680" cy="363600"/>
+            <a:ext cx="2056320" cy="363240"/>
           </a:xfrm>
           <a:prstGeom prst="rect">
             <a:avLst/>
@@ -3793,7 +3818,7 @@
         <p:spPr>
           <a:xfrm>
             <a:off x="3254400" y="819000"/>
-            <a:ext cx="2513880" cy="1370880"/>
+            <a:ext cx="2513520" cy="1370520"/>
           </a:xfrm>
           <a:prstGeom prst="rect">
             <a:avLst/>
@@ -3825,7 +3850,7 @@
         <p:spPr>
           <a:xfrm>
             <a:off x="3146400" y="433800"/>
-            <a:ext cx="2752560" cy="345600"/>
+            <a:ext cx="2752200" cy="345240"/>
           </a:xfrm>
           <a:prstGeom prst="rect">
             <a:avLst/>
@@ -3932,7 +3957,7 @@
         <p:spPr>
           <a:xfrm>
             <a:off x="457200" y="2957400"/>
-            <a:ext cx="2513880" cy="2670480"/>
+            <a:ext cx="2513520" cy="2670120"/>
           </a:xfrm>
           <a:prstGeom prst="rect">
             <a:avLst/>
@@ -3964,7 +3989,7 @@
         <p:spPr>
           <a:xfrm>
             <a:off x="95760" y="2590560"/>
-            <a:ext cx="3157920" cy="345600"/>
+            <a:ext cx="3157560" cy="345240"/>
           </a:xfrm>
           <a:prstGeom prst="rect">
             <a:avLst/>
@@ -4043,7 +4068,7 @@
         <p:spPr>
           <a:xfrm>
             <a:off x="4770360" y="4460400"/>
-            <a:ext cx="2056680" cy="363600"/>
+            <a:ext cx="2056320" cy="363240"/>
           </a:xfrm>
           <a:prstGeom prst="rect">
             <a:avLst/>
@@ -4097,7 +4122,7 @@
         <p:spPr>
           <a:xfrm>
             <a:off x="4770720" y="5144400"/>
-            <a:ext cx="2056680" cy="363600"/>
+            <a:ext cx="2056320" cy="363240"/>
           </a:xfrm>
           <a:prstGeom prst="rect">
             <a:avLst/>
@@ -4291,7 +4316,7 @@
         <p:spPr>
           <a:xfrm>
             <a:off x="4525200" y="2962440"/>
-            <a:ext cx="2513880" cy="2670480"/>
+            <a:ext cx="2513520" cy="2670120"/>
           </a:xfrm>
           <a:prstGeom prst="rect">
             <a:avLst/>
@@ -4323,7 +4348,7 @@
         <p:spPr>
           <a:xfrm>
             <a:off x="4415760" y="2595600"/>
-            <a:ext cx="2814840" cy="345600"/>
+            <a:ext cx="2814480" cy="345240"/>
           </a:xfrm>
           <a:prstGeom prst="rect">
             <a:avLst/>
@@ -4374,7 +4399,7 @@
         <p:spPr>
           <a:xfrm>
             <a:off x="6363360" y="1670400"/>
-            <a:ext cx="2056680" cy="363600"/>
+            <a:ext cx="2056320" cy="363240"/>
           </a:xfrm>
           <a:prstGeom prst="rect">
             <a:avLst/>
@@ -4457,7 +4482,7 @@
         <p:spPr>
           <a:xfrm>
             <a:off x="7664400" y="3074400"/>
-            <a:ext cx="2056680" cy="363600"/>
+            <a:ext cx="2056320" cy="363240"/>
           </a:xfrm>
           <a:prstGeom prst="rect">
             <a:avLst/>
@@ -4540,7 +4565,7 @@
         <p:spPr>
           <a:xfrm>
             <a:off x="7664400" y="3758400"/>
-            <a:ext cx="2056680" cy="363600"/>
+            <a:ext cx="2056320" cy="363240"/>
           </a:xfrm>
           <a:prstGeom prst="rect">
             <a:avLst/>
@@ -4623,7 +4648,7 @@
         <p:spPr>
           <a:xfrm>
             <a:off x="7664400" y="4478400"/>
-            <a:ext cx="2056680" cy="363600"/>
+            <a:ext cx="2056320" cy="363240"/>
           </a:xfrm>
           <a:prstGeom prst="rect">
             <a:avLst/>
@@ -4706,7 +4731,7 @@
         <p:spPr>
           <a:xfrm>
             <a:off x="7664400" y="5162400"/>
-            <a:ext cx="2056680" cy="363600"/>
+            <a:ext cx="2056320" cy="363240"/>
           </a:xfrm>
           <a:prstGeom prst="rect">
             <a:avLst/>
@@ -4789,7 +4814,7 @@
         <p:spPr>
           <a:xfrm>
             <a:off x="6368400" y="950400"/>
-            <a:ext cx="2056680" cy="363600"/>
+            <a:ext cx="2056320" cy="363240"/>
           </a:xfrm>
           <a:prstGeom prst="rect">
             <a:avLst/>
@@ -4902,7 +4927,7 @@
         <p:spPr>
           <a:xfrm>
             <a:off x="457200" y="0"/>
-            <a:ext cx="9070920" cy="459360"/>
+            <a:ext cx="9070560" cy="459000"/>
           </a:xfrm>
           <a:prstGeom prst="rect">
             <a:avLst/>
@@ -4930,7 +4955,11 @@
             </a:pPr>
             <a:r>
               <a:rPr b="0" lang="en-US" sz="2400" spc="-1" strike="noStrike">
-                <a:latin typeface="Arial"/>
+                <a:solidFill>
+                  <a:srgbClr val="000000"/>
+                </a:solidFill>
+                <a:latin typeface="Arial"/>
+                <a:ea typeface="DejaVu Sans"/>
               </a:rPr>
               <a:t>6-course quantum sequence</a:t>
             </a:r>
@@ -4949,9 +4978,9 @@
         <p:grpSpPr>
           <a:xfrm>
             <a:off x="158400" y="675000"/>
-            <a:ext cx="4413240" cy="3102840"/>
+            <a:ext cx="4412880" cy="3102480"/>
             <a:chOff x="158400" y="675000"/>
-            <a:chExt cx="4413240" cy="3102840"/>
+            <a:chExt cx="4412880" cy="3102480"/>
           </a:xfrm>
         </p:grpSpPr>
         <p:sp>
@@ -4963,7 +4992,7 @@
           <p:spPr>
             <a:xfrm>
               <a:off x="332280" y="824760"/>
-              <a:ext cx="1847160" cy="269280"/>
+              <a:ext cx="1846800" cy="268920"/>
             </a:xfrm>
             <a:prstGeom prst="rect">
               <a:avLst/>
@@ -5017,7 +5046,7 @@
           <p:spPr>
             <a:xfrm>
               <a:off x="332280" y="1330560"/>
-              <a:ext cx="1847160" cy="268920"/>
+              <a:ext cx="1846800" cy="268560"/>
             </a:xfrm>
             <a:prstGeom prst="rect">
               <a:avLst/>
@@ -5071,7 +5100,7 @@
           <p:spPr>
             <a:xfrm>
               <a:off x="158400" y="675000"/>
-              <a:ext cx="2217600" cy="3102840"/>
+              <a:ext cx="2217240" cy="3102480"/>
             </a:xfrm>
             <a:prstGeom prst="rect">
               <a:avLst/>
@@ -5131,7 +5160,7 @@
           <p:spPr>
             <a:xfrm>
               <a:off x="2871000" y="1329120"/>
-              <a:ext cx="1696320" cy="267840"/>
+              <a:ext cx="1695960" cy="267480"/>
             </a:xfrm>
             <a:prstGeom prst="rect">
               <a:avLst/>
@@ -5214,7 +5243,7 @@
           <p:spPr>
             <a:xfrm>
               <a:off x="2875320" y="798480"/>
-              <a:ext cx="1696320" cy="267840"/>
+              <a:ext cx="1695960" cy="267480"/>
             </a:xfrm>
             <a:prstGeom prst="rect">
               <a:avLst/>
@@ -5297,7 +5326,7 @@
           <p:spPr>
             <a:xfrm>
               <a:off x="332280" y="1836000"/>
-              <a:ext cx="1847160" cy="269280"/>
+              <a:ext cx="1846800" cy="268920"/>
             </a:xfrm>
             <a:prstGeom prst="rect">
               <a:avLst/>
@@ -5351,7 +5380,7 @@
           <p:spPr>
             <a:xfrm>
               <a:off x="332280" y="2340000"/>
-              <a:ext cx="1847160" cy="269280"/>
+              <a:ext cx="1846800" cy="268920"/>
             </a:xfrm>
             <a:prstGeom prst="rect">
               <a:avLst/>
@@ -5405,7 +5434,7 @@
           <p:spPr>
             <a:xfrm>
               <a:off x="332280" y="2856240"/>
-              <a:ext cx="1847160" cy="269280"/>
+              <a:ext cx="1846800" cy="268920"/>
             </a:xfrm>
             <a:prstGeom prst="rect">
               <a:avLst/>
@@ -5459,7 +5488,7 @@
           <p:spPr>
             <a:xfrm>
               <a:off x="332280" y="3361680"/>
-              <a:ext cx="1847160" cy="269280"/>
+              <a:ext cx="1846800" cy="268920"/>
             </a:xfrm>
             <a:prstGeom prst="rect">
               <a:avLst/>
@@ -5625,7 +5654,7 @@
           <p:spPr>
             <a:xfrm>
               <a:off x="2859120" y="2856240"/>
-              <a:ext cx="1696320" cy="267840"/>
+              <a:ext cx="1695960" cy="267480"/>
             </a:xfrm>
             <a:prstGeom prst="rect">
               <a:avLst/>
@@ -5708,7 +5737,7 @@
           <p:spPr>
             <a:xfrm>
               <a:off x="2859120" y="2356920"/>
-              <a:ext cx="1696320" cy="267840"/>
+              <a:ext cx="1695960" cy="267480"/>
             </a:xfrm>
             <a:prstGeom prst="rect">
               <a:avLst/>
@@ -5791,7 +5820,7 @@
           <p:spPr>
             <a:xfrm>
               <a:off x="2874960" y="1833120"/>
-              <a:ext cx="1696320" cy="267840"/>
+              <a:ext cx="1695960" cy="267480"/>
             </a:xfrm>
             <a:prstGeom prst="rect">
               <a:avLst/>
@@ -5879,7 +5908,7 @@
         <p:spPr>
           <a:xfrm>
             <a:off x="4031280" y="3276360"/>
-            <a:ext cx="6049080" cy="2394000"/>
+            <a:ext cx="6048720" cy="2393640"/>
           </a:xfrm>
           <a:prstGeom prst="rect">
             <a:avLst/>
@@ -5928,7 +5957,7 @@
         <p:spPr>
           <a:xfrm>
             <a:off x="457200" y="0"/>
-            <a:ext cx="9070560" cy="459000"/>
+            <a:ext cx="9070200" cy="458640"/>
           </a:xfrm>
           <a:prstGeom prst="rect">
             <a:avLst/>
@@ -5979,7 +6008,7 @@
         <p:spPr>
           <a:xfrm>
             <a:off x="332280" y="824760"/>
-            <a:ext cx="1846800" cy="268920"/>
+            <a:ext cx="1846440" cy="268560"/>
           </a:xfrm>
           <a:prstGeom prst="rect">
             <a:avLst/>
@@ -6033,7 +6062,7 @@
         <p:spPr>
           <a:xfrm>
             <a:off x="332280" y="1330560"/>
-            <a:ext cx="1846800" cy="268560"/>
+            <a:ext cx="1846440" cy="268200"/>
           </a:xfrm>
           <a:prstGeom prst="rect">
             <a:avLst/>
@@ -6087,7 +6116,7 @@
         <p:spPr>
           <a:xfrm>
             <a:off x="158400" y="675000"/>
-            <a:ext cx="2217240" cy="3102480"/>
+            <a:ext cx="2216880" cy="3102120"/>
           </a:xfrm>
           <a:prstGeom prst="rect">
             <a:avLst/>
@@ -6147,7 +6176,7 @@
         <p:spPr>
           <a:xfrm>
             <a:off x="6172200" y="798480"/>
-            <a:ext cx="2610720" cy="2401920"/>
+            <a:ext cx="2610360" cy="2401560"/>
           </a:xfrm>
           <a:prstGeom prst="rect">
             <a:avLst/>
@@ -6186,6 +6215,663 @@
                 <a:ea typeface="DejaVu Sans"/>
               </a:rPr>
               <a:t>QM Labs</a:t>
+            </a:r>
+            <a:r>
+              <a:rPr b="0" lang="en-US" sz="1400" spc="-1" strike="noStrike">
+                <a:solidFill>
+                  <a:srgbClr val="0000ff"/>
+                </a:solidFill>
+                <a:latin typeface="Arial"/>
+                <a:ea typeface="DejaVu Sans"/>
+              </a:rPr>
+              <a:t>:</a:t>
+            </a:r>
+            <a:endParaRPr b="0" lang="en-US" sz="1400" spc="-1" strike="noStrike">
+              <a:latin typeface="Arial"/>
+            </a:endParaRPr>
+          </a:p>
+          <a:p>
+            <a:pPr marL="216000" indent="-215280">
+              <a:lnSpc>
+                <a:spcPct val="100000"/>
+              </a:lnSpc>
+              <a:buClr>
+                <a:srgbClr val="0000ff"/>
+              </a:buClr>
+              <a:buFont typeface="StarSymbol"/>
+              <a:buAutoNum type="arabicParenR"/>
+            </a:pPr>
+            <a:r>
+              <a:rPr b="0" lang="en-US" sz="1400" spc="-1" strike="noStrike">
+                <a:solidFill>
+                  <a:srgbClr val="0000ff"/>
+                </a:solidFill>
+                <a:latin typeface="Arial"/>
+                <a:ea typeface="DejaVu Sans"/>
+              </a:rPr>
+              <a:t>Non-Classical Correlations</a:t>
+            </a:r>
+            <a:endParaRPr b="0" lang="en-US" sz="1400" spc="-1" strike="noStrike">
+              <a:latin typeface="Arial"/>
+            </a:endParaRPr>
+          </a:p>
+          <a:p>
+            <a:pPr marL="216000" indent="-215280">
+              <a:lnSpc>
+                <a:spcPct val="100000"/>
+              </a:lnSpc>
+              <a:buClr>
+                <a:srgbClr val="0000ff"/>
+              </a:buClr>
+              <a:buFont typeface="StarSymbol"/>
+              <a:buAutoNum type="arabicParenR"/>
+            </a:pPr>
+            <a:r>
+              <a:rPr b="0" lang="en-US" sz="1400" spc="-1" strike="noStrike">
+                <a:solidFill>
+                  <a:srgbClr val="0000ff"/>
+                </a:solidFill>
+                <a:latin typeface="Arial"/>
+                <a:ea typeface="DejaVu Sans"/>
+              </a:rPr>
+              <a:t>Bell Inequality</a:t>
+            </a:r>
+            <a:endParaRPr b="0" lang="en-US" sz="1400" spc="-1" strike="noStrike">
+              <a:latin typeface="Arial"/>
+            </a:endParaRPr>
+          </a:p>
+          <a:p>
+            <a:pPr marL="216000" indent="-215280">
+              <a:lnSpc>
+                <a:spcPct val="100000"/>
+              </a:lnSpc>
+              <a:buClr>
+                <a:srgbClr val="0000ff"/>
+              </a:buClr>
+              <a:buFont typeface="StarSymbol"/>
+              <a:buAutoNum type="arabicParenR"/>
+            </a:pPr>
+            <a:r>
+              <a:rPr b="0" lang="en-US" sz="1400" spc="-1" strike="noStrike">
+                <a:solidFill>
+                  <a:srgbClr val="0000ff"/>
+                </a:solidFill>
+                <a:latin typeface="Arial"/>
+                <a:ea typeface="DejaVu Sans"/>
+              </a:rPr>
+              <a:t>Wave Nature of Photons</a:t>
+            </a:r>
+            <a:endParaRPr b="0" lang="en-US" sz="1400" spc="-1" strike="noStrike">
+              <a:latin typeface="Arial"/>
+            </a:endParaRPr>
+          </a:p>
+          <a:p>
+            <a:pPr marL="216000" indent="-215280">
+              <a:lnSpc>
+                <a:spcPct val="100000"/>
+              </a:lnSpc>
+              <a:buClr>
+                <a:srgbClr val="0000ff"/>
+              </a:buClr>
+              <a:buFont typeface="StarSymbol"/>
+              <a:buAutoNum type="arabicParenR"/>
+            </a:pPr>
+            <a:r>
+              <a:rPr b="0" lang="en-US" sz="1400" spc="-1" strike="noStrike">
+                <a:solidFill>
+                  <a:srgbClr val="0000ff"/>
+                </a:solidFill>
+                <a:latin typeface="Arial"/>
+                <a:ea typeface="DejaVu Sans"/>
+              </a:rPr>
+              <a:t>Quantum Eraser</a:t>
+            </a:r>
+            <a:endParaRPr b="0" lang="en-US" sz="1400" spc="-1" strike="noStrike">
+              <a:latin typeface="Arial"/>
+            </a:endParaRPr>
+          </a:p>
+          <a:p>
+            <a:pPr marL="216000" indent="-215280">
+              <a:lnSpc>
+                <a:spcPct val="100000"/>
+              </a:lnSpc>
+              <a:buClr>
+                <a:srgbClr val="0000ff"/>
+              </a:buClr>
+              <a:buFont typeface="StarSymbol"/>
+              <a:buAutoNum type="arabicParenR"/>
+            </a:pPr>
+            <a:r>
+              <a:rPr b="0" lang="en-US" sz="1400" spc="-1" strike="noStrike">
+                <a:solidFill>
+                  <a:srgbClr val="0000ff"/>
+                </a:solidFill>
+                <a:latin typeface="Arial"/>
+                <a:ea typeface="DejaVu Sans"/>
+              </a:rPr>
+              <a:t>Two-photon Interference</a:t>
+            </a:r>
+            <a:endParaRPr b="0" lang="en-US" sz="1400" spc="-1" strike="noStrike">
+              <a:latin typeface="Arial"/>
+            </a:endParaRPr>
+          </a:p>
+          <a:p>
+            <a:pPr marL="216000" indent="-215280">
+              <a:lnSpc>
+                <a:spcPct val="100000"/>
+              </a:lnSpc>
+              <a:buClr>
+                <a:srgbClr val="0000ff"/>
+              </a:buClr>
+              <a:buFont typeface="StarSymbol"/>
+              <a:buAutoNum type="arabicParenR"/>
+            </a:pPr>
+            <a:r>
+              <a:rPr b="0" lang="en-US" sz="1400" spc="-1" strike="noStrike">
+                <a:solidFill>
+                  <a:srgbClr val="0000ff"/>
+                </a:solidFill>
+                <a:latin typeface="Arial"/>
+                <a:ea typeface="DejaVu Sans"/>
+              </a:rPr>
+              <a:t>Verification HOM 2-photon*</a:t>
+            </a:r>
+            <a:endParaRPr b="0" lang="en-US" sz="1400" spc="-1" strike="noStrike">
+              <a:latin typeface="Arial"/>
+            </a:endParaRPr>
+          </a:p>
+          <a:p>
+            <a:pPr marL="216000" indent="-215280">
+              <a:lnSpc>
+                <a:spcPct val="100000"/>
+              </a:lnSpc>
+              <a:buClr>
+                <a:srgbClr val="0000ff"/>
+              </a:buClr>
+              <a:buFont typeface="StarSymbol"/>
+              <a:buAutoNum type="arabicParenR"/>
+            </a:pPr>
+            <a:r>
+              <a:rPr b="0" lang="en-US" sz="1400" spc="-1" strike="noStrike">
+                <a:solidFill>
+                  <a:srgbClr val="0000ff"/>
+                </a:solidFill>
+                <a:latin typeface="Arial"/>
+                <a:ea typeface="DejaVu Sans"/>
+              </a:rPr>
+              <a:t>Particle Nature of Photons*</a:t>
+            </a:r>
+            <a:endParaRPr b="0" lang="en-US" sz="1400" spc="-1" strike="noStrike">
+              <a:latin typeface="Arial"/>
+            </a:endParaRPr>
+          </a:p>
+          <a:p>
+            <a:pPr marL="216000" indent="-215280">
+              <a:lnSpc>
+                <a:spcPct val="100000"/>
+              </a:lnSpc>
+              <a:buClr>
+                <a:srgbClr val="0000ff"/>
+              </a:buClr>
+              <a:buFont typeface="StarSymbol"/>
+              <a:buAutoNum type="arabicParenR"/>
+            </a:pPr>
+            <a:r>
+              <a:rPr b="0" lang="en-US" sz="1400" spc="-1" strike="noStrike">
+                <a:solidFill>
+                  <a:srgbClr val="0000ff"/>
+                </a:solidFill>
+                <a:latin typeface="Arial"/>
+                <a:ea typeface="DejaVu Sans"/>
+              </a:rPr>
+              <a:t>Wave-Particle Dualism*</a:t>
+            </a:r>
+            <a:endParaRPr b="0" lang="en-US" sz="1400" spc="-1" strike="noStrike">
+              <a:latin typeface="Arial"/>
+            </a:endParaRPr>
+          </a:p>
+          <a:p>
+            <a:pPr marL="216000" indent="-215280">
+              <a:lnSpc>
+                <a:spcPct val="100000"/>
+              </a:lnSpc>
+              <a:buClr>
+                <a:srgbClr val="0000ff"/>
+              </a:buClr>
+              <a:buFont typeface="StarSymbol"/>
+              <a:buAutoNum type="arabicParenR"/>
+            </a:pPr>
+            <a:r>
+              <a:rPr b="0" lang="en-US" sz="1400" spc="-1" strike="noStrike">
+                <a:solidFill>
+                  <a:srgbClr val="0000ff"/>
+                </a:solidFill>
+                <a:latin typeface="Arial"/>
+                <a:ea typeface="DejaVu Sans"/>
+              </a:rPr>
+              <a:t>* </a:t>
+            </a:r>
+            <a:r>
+              <a:rPr b="0" lang="en-US" sz="1200" spc="-1" strike="noStrike">
+                <a:solidFill>
+                  <a:srgbClr val="0000ff"/>
+                </a:solidFill>
+                <a:latin typeface="Arial"/>
+                <a:ea typeface="DejaVu Sans"/>
+              </a:rPr>
+              <a:t>Requires quED-HBT module</a:t>
+            </a:r>
+            <a:endParaRPr b="0" lang="en-US" sz="1200" spc="-1" strike="noStrike">
+              <a:latin typeface="Arial"/>
+            </a:endParaRPr>
+          </a:p>
+        </p:txBody>
+      </p:sp>
+      <p:sp>
+        <p:nvSpPr>
+          <p:cNvPr id="145" name="Line 7"/>
+          <p:cNvSpPr/>
+          <p:nvPr/>
+        </p:nvSpPr>
+        <p:spPr>
+          <a:xfrm flipV="1">
+            <a:off x="2196720" y="914400"/>
+            <a:ext cx="3975480" cy="27360"/>
+          </a:xfrm>
+          <a:prstGeom prst="line">
+            <a:avLst/>
+          </a:prstGeom>
+          <a:ln w="0">
+            <a:solidFill>
+              <a:srgbClr val="3465a4"/>
+            </a:solidFill>
+            <a:headEnd len="med" type="triangle" w="med"/>
+            <a:tailEnd len="med" type="triangle" w="med"/>
+          </a:ln>
+        </p:spPr>
+        <p:style>
+          <a:lnRef idx="0"/>
+          <a:fillRef idx="0"/>
+          <a:effectRef idx="0"/>
+          <a:fontRef idx="minor"/>
+        </p:style>
+      </p:sp>
+      <p:sp>
+        <p:nvSpPr>
+          <p:cNvPr id="146" name="CustomShape 8"/>
+          <p:cNvSpPr/>
+          <p:nvPr/>
+        </p:nvSpPr>
+        <p:spPr>
+          <a:xfrm>
+            <a:off x="332280" y="1836000"/>
+            <a:ext cx="1846440" cy="268560"/>
+          </a:xfrm>
+          <a:prstGeom prst="rect">
+            <a:avLst/>
+          </a:prstGeom>
+          <a:noFill/>
+          <a:ln w="18360">
+            <a:solidFill>
+              <a:srgbClr val="000000"/>
+            </a:solidFill>
+            <a:round/>
+          </a:ln>
+        </p:spPr>
+        <p:style>
+          <a:lnRef idx="0"/>
+          <a:fillRef idx="0"/>
+          <a:effectRef idx="0"/>
+          <a:fontRef idx="minor"/>
+        </p:style>
+        <p:txBody>
+          <a:bodyPr lIns="99000" rIns="99000" tIns="54000" bIns="54000">
+            <a:noAutofit/>
+          </a:bodyPr>
+          <a:p>
+            <a:pPr algn="ctr">
+              <a:lnSpc>
+                <a:spcPct val="100000"/>
+              </a:lnSpc>
+            </a:pPr>
+            <a:r>
+              <a:rPr b="0" lang="en-US" sz="1400" spc="-1" strike="noStrike">
+                <a:solidFill>
+                  <a:srgbClr val="000000"/>
+                </a:solidFill>
+                <a:latin typeface="Arial"/>
+                <a:ea typeface="DejaVu Sans"/>
+              </a:rPr>
+              <a:t>Quant Algos (ML)</a:t>
+            </a:r>
+            <a:endParaRPr b="0" lang="en-US" sz="1400" spc="-1" strike="noStrike">
+              <a:latin typeface="Arial"/>
+            </a:endParaRPr>
+          </a:p>
+        </p:txBody>
+      </p:sp>
+      <p:sp>
+        <p:nvSpPr>
+          <p:cNvPr id="147" name="CustomShape 9"/>
+          <p:cNvSpPr/>
+          <p:nvPr/>
+        </p:nvSpPr>
+        <p:spPr>
+          <a:xfrm>
+            <a:off x="332280" y="2340000"/>
+            <a:ext cx="1846440" cy="268560"/>
+          </a:xfrm>
+          <a:prstGeom prst="rect">
+            <a:avLst/>
+          </a:prstGeom>
+          <a:noFill/>
+          <a:ln w="18360">
+            <a:solidFill>
+              <a:srgbClr val="000000"/>
+            </a:solidFill>
+            <a:round/>
+          </a:ln>
+        </p:spPr>
+        <p:style>
+          <a:lnRef idx="0"/>
+          <a:fillRef idx="0"/>
+          <a:effectRef idx="0"/>
+          <a:fontRef idx="minor"/>
+        </p:style>
+        <p:txBody>
+          <a:bodyPr lIns="99000" rIns="99000" tIns="54000" bIns="54000">
+            <a:noAutofit/>
+          </a:bodyPr>
+          <a:p>
+            <a:pPr algn="ctr">
+              <a:lnSpc>
+                <a:spcPct val="100000"/>
+              </a:lnSpc>
+            </a:pPr>
+            <a:r>
+              <a:rPr b="0" lang="en-US" sz="1400" spc="-1" strike="noStrike">
+                <a:solidFill>
+                  <a:srgbClr val="000000"/>
+                </a:solidFill>
+                <a:latin typeface="Arial"/>
+                <a:ea typeface="DejaVu Sans"/>
+              </a:rPr>
+              <a:t>Applied Q (Sensing)</a:t>
+            </a:r>
+            <a:endParaRPr b="0" lang="en-US" sz="1400" spc="-1" strike="noStrike">
+              <a:latin typeface="Arial"/>
+            </a:endParaRPr>
+          </a:p>
+        </p:txBody>
+      </p:sp>
+      <p:sp>
+        <p:nvSpPr>
+          <p:cNvPr id="148" name="CustomShape 10"/>
+          <p:cNvSpPr/>
+          <p:nvPr/>
+        </p:nvSpPr>
+        <p:spPr>
+          <a:xfrm>
+            <a:off x="332280" y="2856240"/>
+            <a:ext cx="1846440" cy="268560"/>
+          </a:xfrm>
+          <a:prstGeom prst="rect">
+            <a:avLst/>
+          </a:prstGeom>
+          <a:noFill/>
+          <a:ln w="18360">
+            <a:solidFill>
+              <a:srgbClr val="000000"/>
+            </a:solidFill>
+            <a:round/>
+          </a:ln>
+        </p:spPr>
+        <p:style>
+          <a:lnRef idx="0"/>
+          <a:fillRef idx="0"/>
+          <a:effectRef idx="0"/>
+          <a:fontRef idx="minor"/>
+        </p:style>
+        <p:txBody>
+          <a:bodyPr lIns="99000" rIns="99000" tIns="54000" bIns="54000">
+            <a:noAutofit/>
+          </a:bodyPr>
+          <a:p>
+            <a:pPr algn="ctr">
+              <a:lnSpc>
+                <a:spcPct val="100000"/>
+              </a:lnSpc>
+            </a:pPr>
+            <a:r>
+              <a:rPr b="0" lang="en-US" sz="1400" spc="-1" strike="noStrike">
+                <a:solidFill>
+                  <a:srgbClr val="000000"/>
+                </a:solidFill>
+                <a:latin typeface="Arial"/>
+                <a:ea typeface="DejaVu Sans"/>
+              </a:rPr>
+              <a:t>Quantum Crypto</a:t>
+            </a:r>
+            <a:endParaRPr b="0" lang="en-US" sz="1400" spc="-1" strike="noStrike">
+              <a:latin typeface="Arial"/>
+            </a:endParaRPr>
+          </a:p>
+        </p:txBody>
+      </p:sp>
+      <p:sp>
+        <p:nvSpPr>
+          <p:cNvPr id="149" name="CustomShape 11"/>
+          <p:cNvSpPr/>
+          <p:nvPr/>
+        </p:nvSpPr>
+        <p:spPr>
+          <a:xfrm>
+            <a:off x="332280" y="3361680"/>
+            <a:ext cx="1846440" cy="268560"/>
+          </a:xfrm>
+          <a:prstGeom prst="rect">
+            <a:avLst/>
+          </a:prstGeom>
+          <a:noFill/>
+          <a:ln w="18360">
+            <a:solidFill>
+              <a:srgbClr val="000000"/>
+            </a:solidFill>
+            <a:round/>
+          </a:ln>
+        </p:spPr>
+        <p:style>
+          <a:lnRef idx="0"/>
+          <a:fillRef idx="0"/>
+          <a:effectRef idx="0"/>
+          <a:fontRef idx="minor"/>
+        </p:style>
+        <p:txBody>
+          <a:bodyPr lIns="99000" rIns="99000" tIns="54000" bIns="54000">
+            <a:noAutofit/>
+          </a:bodyPr>
+          <a:p>
+            <a:pPr algn="ctr">
+              <a:lnSpc>
+                <a:spcPct val="100000"/>
+              </a:lnSpc>
+            </a:pPr>
+            <a:r>
+              <a:rPr b="0" lang="en-US" sz="1400" spc="-1" strike="noStrike">
+                <a:solidFill>
+                  <a:srgbClr val="000000"/>
+                </a:solidFill>
+                <a:latin typeface="Arial"/>
+                <a:ea typeface="DejaVu Sans"/>
+              </a:rPr>
+              <a:t>Quantum Capstone</a:t>
+            </a:r>
+            <a:endParaRPr b="0" lang="en-US" sz="1400" spc="-1" strike="noStrike">
+              <a:latin typeface="Arial"/>
+            </a:endParaRPr>
+          </a:p>
+        </p:txBody>
+      </p:sp>
+      <p:sp>
+        <p:nvSpPr>
+          <p:cNvPr id="150" name="Line 12"/>
+          <p:cNvSpPr/>
+          <p:nvPr/>
+        </p:nvSpPr>
+        <p:spPr>
+          <a:xfrm>
+            <a:off x="1234800" y="1597680"/>
+            <a:ext cx="0" cy="236880"/>
+          </a:xfrm>
+          <a:prstGeom prst="line">
+            <a:avLst/>
+          </a:prstGeom>
+          <a:ln w="0">
+            <a:solidFill>
+              <a:srgbClr val="3465a4"/>
+            </a:solidFill>
+            <a:tailEnd len="med" type="triangle" w="med"/>
+          </a:ln>
+        </p:spPr>
+        <p:style>
+          <a:lnRef idx="0"/>
+          <a:fillRef idx="0"/>
+          <a:effectRef idx="0"/>
+          <a:fontRef idx="minor"/>
+        </p:style>
+      </p:sp>
+      <p:sp>
+        <p:nvSpPr>
+          <p:cNvPr id="151" name="Line 13"/>
+          <p:cNvSpPr/>
+          <p:nvPr/>
+        </p:nvSpPr>
+        <p:spPr>
+          <a:xfrm>
+            <a:off x="1234800" y="2101680"/>
+            <a:ext cx="0" cy="236880"/>
+          </a:xfrm>
+          <a:prstGeom prst="line">
+            <a:avLst/>
+          </a:prstGeom>
+          <a:ln w="0">
+            <a:solidFill>
+              <a:srgbClr val="3465a4"/>
+            </a:solidFill>
+            <a:tailEnd len="med" type="triangle" w="med"/>
+          </a:ln>
+        </p:spPr>
+        <p:style>
+          <a:lnRef idx="0"/>
+          <a:fillRef idx="0"/>
+          <a:effectRef idx="0"/>
+          <a:fontRef idx="minor"/>
+        </p:style>
+      </p:sp>
+      <p:sp>
+        <p:nvSpPr>
+          <p:cNvPr id="152" name="Line 14"/>
+          <p:cNvSpPr/>
+          <p:nvPr/>
+        </p:nvSpPr>
+        <p:spPr>
+          <a:xfrm>
+            <a:off x="1234800" y="2606040"/>
+            <a:ext cx="0" cy="236880"/>
+          </a:xfrm>
+          <a:prstGeom prst="line">
+            <a:avLst/>
+          </a:prstGeom>
+          <a:ln w="0">
+            <a:solidFill>
+              <a:srgbClr val="3465a4"/>
+            </a:solidFill>
+            <a:tailEnd len="med" type="triangle" w="med"/>
+          </a:ln>
+        </p:spPr>
+        <p:style>
+          <a:lnRef idx="0"/>
+          <a:fillRef idx="0"/>
+          <a:effectRef idx="0"/>
+          <a:fontRef idx="minor"/>
+        </p:style>
+      </p:sp>
+      <p:sp>
+        <p:nvSpPr>
+          <p:cNvPr id="153" name="Line 15"/>
+          <p:cNvSpPr/>
+          <p:nvPr/>
+        </p:nvSpPr>
+        <p:spPr>
+          <a:xfrm>
+            <a:off x="1234800" y="3124800"/>
+            <a:ext cx="0" cy="236880"/>
+          </a:xfrm>
+          <a:prstGeom prst="line">
+            <a:avLst/>
+          </a:prstGeom>
+          <a:ln w="0">
+            <a:solidFill>
+              <a:srgbClr val="3465a4"/>
+            </a:solidFill>
+            <a:tailEnd len="med" type="triangle" w="med"/>
+          </a:ln>
+        </p:spPr>
+        <p:style>
+          <a:lnRef idx="0"/>
+          <a:fillRef idx="0"/>
+          <a:effectRef idx="0"/>
+          <a:fontRef idx="minor"/>
+        </p:style>
+      </p:sp>
+      <p:sp>
+        <p:nvSpPr>
+          <p:cNvPr id="154" name="CustomShape 16"/>
+          <p:cNvSpPr/>
+          <p:nvPr/>
+        </p:nvSpPr>
+        <p:spPr>
+          <a:xfrm>
+            <a:off x="2876040" y="2331720"/>
+            <a:ext cx="3067200" cy="1554120"/>
+          </a:xfrm>
+          <a:prstGeom prst="rect">
+            <a:avLst/>
+          </a:prstGeom>
+          <a:noFill/>
+          <a:ln w="18360">
+            <a:solidFill>
+              <a:srgbClr val="0000ff"/>
+            </a:solidFill>
+            <a:round/>
+          </a:ln>
+        </p:spPr>
+        <p:style>
+          <a:lnRef idx="0"/>
+          <a:fillRef idx="0"/>
+          <a:effectRef idx="0"/>
+          <a:fontRef idx="minor"/>
+        </p:style>
+        <p:txBody>
+          <a:bodyPr lIns="99000" rIns="99000" tIns="54000" bIns="54000">
+            <a:noAutofit/>
+          </a:bodyPr>
+          <a:p>
+            <a:pPr algn="ctr">
+              <a:lnSpc>
+                <a:spcPct val="100000"/>
+              </a:lnSpc>
+            </a:pPr>
+            <a:r>
+              <a:rPr b="0" lang="en-US" sz="1400" spc="-1" strike="noStrike" u="sng">
+                <a:solidFill>
+                  <a:srgbClr val="0000ff"/>
+                </a:solidFill>
+                <a:uFillTx/>
+                <a:latin typeface="Arial"/>
+                <a:ea typeface="DejaVu Sans"/>
+              </a:rPr>
+              <a:t>Q-Sensing Labs</a:t>
             </a:r>
             <a:r>
               <a:rPr b="0" lang="en-US" sz="1400" spc="-1" strike="noStrike">
@@ -6220,7 +6906,7 @@
                 <a:latin typeface="Arial"/>
                 <a:ea typeface="DejaVu Sans"/>
               </a:rPr>
-              <a:t>Non-Classical Correlations</a:t>
+              <a:t>Quantum Magnetometry</a:t>
             </a:r>
             <a:endParaRPr b="0" lang="en-US" sz="1400" spc="-1" strike="noStrike">
               <a:latin typeface="Arial"/>
@@ -6245,7 +6931,7 @@
                 <a:latin typeface="Arial"/>
                 <a:ea typeface="DejaVu Sans"/>
               </a:rPr>
-              <a:t>Bell Inequality</a:t>
+              <a:t>Ghost Imaging</a:t>
             </a:r>
             <a:endParaRPr b="0" lang="en-US" sz="1400" spc="-1" strike="noStrike">
               <a:latin typeface="Arial"/>
@@ -6270,7 +6956,7 @@
                 <a:latin typeface="Arial"/>
                 <a:ea typeface="DejaVu Sans"/>
               </a:rPr>
-              <a:t>Wave Nature of Photons</a:t>
+              <a:t>Ghost Spectroscopy</a:t>
             </a:r>
             <a:endParaRPr b="0" lang="en-US" sz="1400" spc="-1" strike="noStrike">
               <a:latin typeface="Arial"/>
@@ -6295,7 +6981,7 @@
                 <a:latin typeface="Arial"/>
                 <a:ea typeface="DejaVu Sans"/>
               </a:rPr>
-              <a:t>Quantum Eraser</a:t>
+              <a:t>Non-Line-of-Sight Imaging</a:t>
             </a:r>
             <a:endParaRPr b="0" lang="en-US" sz="1400" spc="-1" strike="noStrike">
               <a:latin typeface="Arial"/>
@@ -6320,663 +7006,6 @@
                 <a:latin typeface="Arial"/>
                 <a:ea typeface="DejaVu Sans"/>
               </a:rPr>
-              <a:t>Two-photon Interference</a:t>
-            </a:r>
-            <a:endParaRPr b="0" lang="en-US" sz="1400" spc="-1" strike="noStrike">
-              <a:latin typeface="Arial"/>
-            </a:endParaRPr>
-          </a:p>
-          <a:p>
-            <a:pPr marL="216000" indent="-215640">
-              <a:lnSpc>
-                <a:spcPct val="100000"/>
-              </a:lnSpc>
-              <a:buClr>
-                <a:srgbClr val="0000ff"/>
-              </a:buClr>
-              <a:buFont typeface="StarSymbol"/>
-              <a:buAutoNum type="arabicParenR"/>
-            </a:pPr>
-            <a:r>
-              <a:rPr b="0" lang="en-US" sz="1400" spc="-1" strike="noStrike">
-                <a:solidFill>
-                  <a:srgbClr val="0000ff"/>
-                </a:solidFill>
-                <a:latin typeface="Arial"/>
-                <a:ea typeface="DejaVu Sans"/>
-              </a:rPr>
-              <a:t>Verification HOM 2-photon*</a:t>
-            </a:r>
-            <a:endParaRPr b="0" lang="en-US" sz="1400" spc="-1" strike="noStrike">
-              <a:latin typeface="Arial"/>
-            </a:endParaRPr>
-          </a:p>
-          <a:p>
-            <a:pPr marL="216000" indent="-215640">
-              <a:lnSpc>
-                <a:spcPct val="100000"/>
-              </a:lnSpc>
-              <a:buClr>
-                <a:srgbClr val="0000ff"/>
-              </a:buClr>
-              <a:buFont typeface="StarSymbol"/>
-              <a:buAutoNum type="arabicParenR"/>
-            </a:pPr>
-            <a:r>
-              <a:rPr b="0" lang="en-US" sz="1400" spc="-1" strike="noStrike">
-                <a:solidFill>
-                  <a:srgbClr val="0000ff"/>
-                </a:solidFill>
-                <a:latin typeface="Arial"/>
-                <a:ea typeface="DejaVu Sans"/>
-              </a:rPr>
-              <a:t>Particle Nature of Photons*</a:t>
-            </a:r>
-            <a:endParaRPr b="0" lang="en-US" sz="1400" spc="-1" strike="noStrike">
-              <a:latin typeface="Arial"/>
-            </a:endParaRPr>
-          </a:p>
-          <a:p>
-            <a:pPr marL="216000" indent="-215640">
-              <a:lnSpc>
-                <a:spcPct val="100000"/>
-              </a:lnSpc>
-              <a:buClr>
-                <a:srgbClr val="0000ff"/>
-              </a:buClr>
-              <a:buFont typeface="StarSymbol"/>
-              <a:buAutoNum type="arabicParenR"/>
-            </a:pPr>
-            <a:r>
-              <a:rPr b="0" lang="en-US" sz="1400" spc="-1" strike="noStrike">
-                <a:solidFill>
-                  <a:srgbClr val="0000ff"/>
-                </a:solidFill>
-                <a:latin typeface="Arial"/>
-                <a:ea typeface="DejaVu Sans"/>
-              </a:rPr>
-              <a:t>Wave-Particle Dualism*</a:t>
-            </a:r>
-            <a:endParaRPr b="0" lang="en-US" sz="1400" spc="-1" strike="noStrike">
-              <a:latin typeface="Arial"/>
-            </a:endParaRPr>
-          </a:p>
-          <a:p>
-            <a:pPr marL="216000" indent="-215640">
-              <a:lnSpc>
-                <a:spcPct val="100000"/>
-              </a:lnSpc>
-              <a:buClr>
-                <a:srgbClr val="0000ff"/>
-              </a:buClr>
-              <a:buFont typeface="StarSymbol"/>
-              <a:buAutoNum type="arabicParenR"/>
-            </a:pPr>
-            <a:r>
-              <a:rPr b="0" lang="en-US" sz="1400" spc="-1" strike="noStrike">
-                <a:solidFill>
-                  <a:srgbClr val="0000ff"/>
-                </a:solidFill>
-                <a:latin typeface="Arial"/>
-                <a:ea typeface="DejaVu Sans"/>
-              </a:rPr>
-              <a:t>* </a:t>
-            </a:r>
-            <a:r>
-              <a:rPr b="0" lang="en-US" sz="1200" spc="-1" strike="noStrike">
-                <a:solidFill>
-                  <a:srgbClr val="0000ff"/>
-                </a:solidFill>
-                <a:latin typeface="Arial"/>
-                <a:ea typeface="DejaVu Sans"/>
-              </a:rPr>
-              <a:t>Requires quED-HBT module</a:t>
-            </a:r>
-            <a:endParaRPr b="0" lang="en-US" sz="1200" spc="-1" strike="noStrike">
-              <a:latin typeface="Arial"/>
-            </a:endParaRPr>
-          </a:p>
-        </p:txBody>
-      </p:sp>
-      <p:sp>
-        <p:nvSpPr>
-          <p:cNvPr id="145" name="Line 7"/>
-          <p:cNvSpPr/>
-          <p:nvPr/>
-        </p:nvSpPr>
-        <p:spPr>
-          <a:xfrm flipV="1">
-            <a:off x="2196720" y="914400"/>
-            <a:ext cx="3975480" cy="27360"/>
-          </a:xfrm>
-          <a:prstGeom prst="line">
-            <a:avLst/>
-          </a:prstGeom>
-          <a:ln w="0">
-            <a:solidFill>
-              <a:srgbClr val="3465a4"/>
-            </a:solidFill>
-            <a:headEnd len="med" type="triangle" w="med"/>
-            <a:tailEnd len="med" type="triangle" w="med"/>
-          </a:ln>
-        </p:spPr>
-        <p:style>
-          <a:lnRef idx="0"/>
-          <a:fillRef idx="0"/>
-          <a:effectRef idx="0"/>
-          <a:fontRef idx="minor"/>
-        </p:style>
-      </p:sp>
-      <p:sp>
-        <p:nvSpPr>
-          <p:cNvPr id="146" name="CustomShape 8"/>
-          <p:cNvSpPr/>
-          <p:nvPr/>
-        </p:nvSpPr>
-        <p:spPr>
-          <a:xfrm>
-            <a:off x="332280" y="1836000"/>
-            <a:ext cx="1846800" cy="268920"/>
-          </a:xfrm>
-          <a:prstGeom prst="rect">
-            <a:avLst/>
-          </a:prstGeom>
-          <a:noFill/>
-          <a:ln w="18360">
-            <a:solidFill>
-              <a:srgbClr val="000000"/>
-            </a:solidFill>
-            <a:round/>
-          </a:ln>
-        </p:spPr>
-        <p:style>
-          <a:lnRef idx="0"/>
-          <a:fillRef idx="0"/>
-          <a:effectRef idx="0"/>
-          <a:fontRef idx="minor"/>
-        </p:style>
-        <p:txBody>
-          <a:bodyPr lIns="99000" rIns="99000" tIns="54000" bIns="54000">
-            <a:noAutofit/>
-          </a:bodyPr>
-          <a:p>
-            <a:pPr algn="ctr">
-              <a:lnSpc>
-                <a:spcPct val="100000"/>
-              </a:lnSpc>
-            </a:pPr>
-            <a:r>
-              <a:rPr b="0" lang="en-US" sz="1400" spc="-1" strike="noStrike">
-                <a:solidFill>
-                  <a:srgbClr val="000000"/>
-                </a:solidFill>
-                <a:latin typeface="Arial"/>
-                <a:ea typeface="DejaVu Sans"/>
-              </a:rPr>
-              <a:t>Quant Algos (ML)</a:t>
-            </a:r>
-            <a:endParaRPr b="0" lang="en-US" sz="1400" spc="-1" strike="noStrike">
-              <a:latin typeface="Arial"/>
-            </a:endParaRPr>
-          </a:p>
-        </p:txBody>
-      </p:sp>
-      <p:sp>
-        <p:nvSpPr>
-          <p:cNvPr id="147" name="CustomShape 9"/>
-          <p:cNvSpPr/>
-          <p:nvPr/>
-        </p:nvSpPr>
-        <p:spPr>
-          <a:xfrm>
-            <a:off x="332280" y="2340000"/>
-            <a:ext cx="1846800" cy="268920"/>
-          </a:xfrm>
-          <a:prstGeom prst="rect">
-            <a:avLst/>
-          </a:prstGeom>
-          <a:noFill/>
-          <a:ln w="18360">
-            <a:solidFill>
-              <a:srgbClr val="000000"/>
-            </a:solidFill>
-            <a:round/>
-          </a:ln>
-        </p:spPr>
-        <p:style>
-          <a:lnRef idx="0"/>
-          <a:fillRef idx="0"/>
-          <a:effectRef idx="0"/>
-          <a:fontRef idx="minor"/>
-        </p:style>
-        <p:txBody>
-          <a:bodyPr lIns="99000" rIns="99000" tIns="54000" bIns="54000">
-            <a:noAutofit/>
-          </a:bodyPr>
-          <a:p>
-            <a:pPr algn="ctr">
-              <a:lnSpc>
-                <a:spcPct val="100000"/>
-              </a:lnSpc>
-            </a:pPr>
-            <a:r>
-              <a:rPr b="0" lang="en-US" sz="1400" spc="-1" strike="noStrike">
-                <a:solidFill>
-                  <a:srgbClr val="000000"/>
-                </a:solidFill>
-                <a:latin typeface="Arial"/>
-                <a:ea typeface="DejaVu Sans"/>
-              </a:rPr>
-              <a:t>Applied Q (Sensing)</a:t>
-            </a:r>
-            <a:endParaRPr b="0" lang="en-US" sz="1400" spc="-1" strike="noStrike">
-              <a:latin typeface="Arial"/>
-            </a:endParaRPr>
-          </a:p>
-        </p:txBody>
-      </p:sp>
-      <p:sp>
-        <p:nvSpPr>
-          <p:cNvPr id="148" name="CustomShape 10"/>
-          <p:cNvSpPr/>
-          <p:nvPr/>
-        </p:nvSpPr>
-        <p:spPr>
-          <a:xfrm>
-            <a:off x="332280" y="2856240"/>
-            <a:ext cx="1846800" cy="268920"/>
-          </a:xfrm>
-          <a:prstGeom prst="rect">
-            <a:avLst/>
-          </a:prstGeom>
-          <a:noFill/>
-          <a:ln w="18360">
-            <a:solidFill>
-              <a:srgbClr val="000000"/>
-            </a:solidFill>
-            <a:round/>
-          </a:ln>
-        </p:spPr>
-        <p:style>
-          <a:lnRef idx="0"/>
-          <a:fillRef idx="0"/>
-          <a:effectRef idx="0"/>
-          <a:fontRef idx="minor"/>
-        </p:style>
-        <p:txBody>
-          <a:bodyPr lIns="99000" rIns="99000" tIns="54000" bIns="54000">
-            <a:noAutofit/>
-          </a:bodyPr>
-          <a:p>
-            <a:pPr algn="ctr">
-              <a:lnSpc>
-                <a:spcPct val="100000"/>
-              </a:lnSpc>
-            </a:pPr>
-            <a:r>
-              <a:rPr b="0" lang="en-US" sz="1400" spc="-1" strike="noStrike">
-                <a:solidFill>
-                  <a:srgbClr val="000000"/>
-                </a:solidFill>
-                <a:latin typeface="Arial"/>
-                <a:ea typeface="DejaVu Sans"/>
-              </a:rPr>
-              <a:t>Quantum Crypto</a:t>
-            </a:r>
-            <a:endParaRPr b="0" lang="en-US" sz="1400" spc="-1" strike="noStrike">
-              <a:latin typeface="Arial"/>
-            </a:endParaRPr>
-          </a:p>
-        </p:txBody>
-      </p:sp>
-      <p:sp>
-        <p:nvSpPr>
-          <p:cNvPr id="149" name="CustomShape 11"/>
-          <p:cNvSpPr/>
-          <p:nvPr/>
-        </p:nvSpPr>
-        <p:spPr>
-          <a:xfrm>
-            <a:off x="332280" y="3361680"/>
-            <a:ext cx="1846800" cy="268920"/>
-          </a:xfrm>
-          <a:prstGeom prst="rect">
-            <a:avLst/>
-          </a:prstGeom>
-          <a:noFill/>
-          <a:ln w="18360">
-            <a:solidFill>
-              <a:srgbClr val="000000"/>
-            </a:solidFill>
-            <a:round/>
-          </a:ln>
-        </p:spPr>
-        <p:style>
-          <a:lnRef idx="0"/>
-          <a:fillRef idx="0"/>
-          <a:effectRef idx="0"/>
-          <a:fontRef idx="minor"/>
-        </p:style>
-        <p:txBody>
-          <a:bodyPr lIns="99000" rIns="99000" tIns="54000" bIns="54000">
-            <a:noAutofit/>
-          </a:bodyPr>
-          <a:p>
-            <a:pPr algn="ctr">
-              <a:lnSpc>
-                <a:spcPct val="100000"/>
-              </a:lnSpc>
-            </a:pPr>
-            <a:r>
-              <a:rPr b="0" lang="en-US" sz="1400" spc="-1" strike="noStrike">
-                <a:solidFill>
-                  <a:srgbClr val="000000"/>
-                </a:solidFill>
-                <a:latin typeface="Arial"/>
-                <a:ea typeface="DejaVu Sans"/>
-              </a:rPr>
-              <a:t>Quantum Capstone</a:t>
-            </a:r>
-            <a:endParaRPr b="0" lang="en-US" sz="1400" spc="-1" strike="noStrike">
-              <a:latin typeface="Arial"/>
-            </a:endParaRPr>
-          </a:p>
-        </p:txBody>
-      </p:sp>
-      <p:sp>
-        <p:nvSpPr>
-          <p:cNvPr id="150" name="Line 12"/>
-          <p:cNvSpPr/>
-          <p:nvPr/>
-        </p:nvSpPr>
-        <p:spPr>
-          <a:xfrm>
-            <a:off x="1234800" y="1597680"/>
-            <a:ext cx="0" cy="236880"/>
-          </a:xfrm>
-          <a:prstGeom prst="line">
-            <a:avLst/>
-          </a:prstGeom>
-          <a:ln w="0">
-            <a:solidFill>
-              <a:srgbClr val="3465a4"/>
-            </a:solidFill>
-            <a:tailEnd len="med" type="triangle" w="med"/>
-          </a:ln>
-        </p:spPr>
-        <p:style>
-          <a:lnRef idx="0"/>
-          <a:fillRef idx="0"/>
-          <a:effectRef idx="0"/>
-          <a:fontRef idx="minor"/>
-        </p:style>
-      </p:sp>
-      <p:sp>
-        <p:nvSpPr>
-          <p:cNvPr id="151" name="Line 13"/>
-          <p:cNvSpPr/>
-          <p:nvPr/>
-        </p:nvSpPr>
-        <p:spPr>
-          <a:xfrm>
-            <a:off x="1234800" y="2101680"/>
-            <a:ext cx="0" cy="236880"/>
-          </a:xfrm>
-          <a:prstGeom prst="line">
-            <a:avLst/>
-          </a:prstGeom>
-          <a:ln w="0">
-            <a:solidFill>
-              <a:srgbClr val="3465a4"/>
-            </a:solidFill>
-            <a:tailEnd len="med" type="triangle" w="med"/>
-          </a:ln>
-        </p:spPr>
-        <p:style>
-          <a:lnRef idx="0"/>
-          <a:fillRef idx="0"/>
-          <a:effectRef idx="0"/>
-          <a:fontRef idx="minor"/>
-        </p:style>
-      </p:sp>
-      <p:sp>
-        <p:nvSpPr>
-          <p:cNvPr id="152" name="Line 14"/>
-          <p:cNvSpPr/>
-          <p:nvPr/>
-        </p:nvSpPr>
-        <p:spPr>
-          <a:xfrm>
-            <a:off x="1234800" y="2606040"/>
-            <a:ext cx="0" cy="236880"/>
-          </a:xfrm>
-          <a:prstGeom prst="line">
-            <a:avLst/>
-          </a:prstGeom>
-          <a:ln w="0">
-            <a:solidFill>
-              <a:srgbClr val="3465a4"/>
-            </a:solidFill>
-            <a:tailEnd len="med" type="triangle" w="med"/>
-          </a:ln>
-        </p:spPr>
-        <p:style>
-          <a:lnRef idx="0"/>
-          <a:fillRef idx="0"/>
-          <a:effectRef idx="0"/>
-          <a:fontRef idx="minor"/>
-        </p:style>
-      </p:sp>
-      <p:sp>
-        <p:nvSpPr>
-          <p:cNvPr id="153" name="Line 15"/>
-          <p:cNvSpPr/>
-          <p:nvPr/>
-        </p:nvSpPr>
-        <p:spPr>
-          <a:xfrm>
-            <a:off x="1234800" y="3124800"/>
-            <a:ext cx="0" cy="236880"/>
-          </a:xfrm>
-          <a:prstGeom prst="line">
-            <a:avLst/>
-          </a:prstGeom>
-          <a:ln w="0">
-            <a:solidFill>
-              <a:srgbClr val="3465a4"/>
-            </a:solidFill>
-            <a:tailEnd len="med" type="triangle" w="med"/>
-          </a:ln>
-        </p:spPr>
-        <p:style>
-          <a:lnRef idx="0"/>
-          <a:fillRef idx="0"/>
-          <a:effectRef idx="0"/>
-          <a:fontRef idx="minor"/>
-        </p:style>
-      </p:sp>
-      <p:sp>
-        <p:nvSpPr>
-          <p:cNvPr id="154" name="CustomShape 16"/>
-          <p:cNvSpPr/>
-          <p:nvPr/>
-        </p:nvSpPr>
-        <p:spPr>
-          <a:xfrm>
-            <a:off x="2876040" y="2331720"/>
-            <a:ext cx="3067560" cy="1554480"/>
-          </a:xfrm>
-          <a:prstGeom prst="rect">
-            <a:avLst/>
-          </a:prstGeom>
-          <a:noFill/>
-          <a:ln w="18360">
-            <a:solidFill>
-              <a:srgbClr val="0000ff"/>
-            </a:solidFill>
-            <a:round/>
-          </a:ln>
-        </p:spPr>
-        <p:style>
-          <a:lnRef idx="0"/>
-          <a:fillRef idx="0"/>
-          <a:effectRef idx="0"/>
-          <a:fontRef idx="minor"/>
-        </p:style>
-        <p:txBody>
-          <a:bodyPr lIns="99000" rIns="99000" tIns="54000" bIns="54000">
-            <a:noAutofit/>
-          </a:bodyPr>
-          <a:p>
-            <a:pPr algn="ctr">
-              <a:lnSpc>
-                <a:spcPct val="100000"/>
-              </a:lnSpc>
-            </a:pPr>
-            <a:r>
-              <a:rPr b="0" lang="en-US" sz="1400" spc="-1" strike="noStrike" u="sng">
-                <a:solidFill>
-                  <a:srgbClr val="0000ff"/>
-                </a:solidFill>
-                <a:uFillTx/>
-                <a:latin typeface="Arial"/>
-                <a:ea typeface="DejaVu Sans"/>
-              </a:rPr>
-              <a:t>Q-Sensing Labs</a:t>
-            </a:r>
-            <a:r>
-              <a:rPr b="0" lang="en-US" sz="1400" spc="-1" strike="noStrike">
-                <a:solidFill>
-                  <a:srgbClr val="0000ff"/>
-                </a:solidFill>
-                <a:latin typeface="Arial"/>
-                <a:ea typeface="DejaVu Sans"/>
-              </a:rPr>
-              <a:t>:</a:t>
-            </a:r>
-            <a:endParaRPr b="0" lang="en-US" sz="1400" spc="-1" strike="noStrike">
-              <a:latin typeface="Arial"/>
-            </a:endParaRPr>
-          </a:p>
-          <a:p>
-            <a:pPr marL="216000" indent="-216000">
-              <a:lnSpc>
-                <a:spcPct val="100000"/>
-              </a:lnSpc>
-              <a:buClr>
-                <a:srgbClr val="0000ff"/>
-              </a:buClr>
-              <a:buFont typeface="StarSymbol"/>
-              <a:buAutoNum type="arabicParenR"/>
-            </a:pPr>
-            <a:r>
-              <a:rPr b="0" lang="en-US" sz="1400" spc="-1" strike="noStrike">
-                <a:solidFill>
-                  <a:srgbClr val="0000ff"/>
-                </a:solidFill>
-                <a:latin typeface="Arial"/>
-                <a:ea typeface="DejaVu Sans"/>
-              </a:rPr>
-              <a:t>Quantum Magnetometry</a:t>
-            </a:r>
-            <a:endParaRPr b="0" lang="en-US" sz="1400" spc="-1" strike="noStrike">
-              <a:latin typeface="Arial"/>
-            </a:endParaRPr>
-          </a:p>
-          <a:p>
-            <a:pPr marL="216000" indent="-216000">
-              <a:lnSpc>
-                <a:spcPct val="100000"/>
-              </a:lnSpc>
-              <a:buClr>
-                <a:srgbClr val="0000ff"/>
-              </a:buClr>
-              <a:buFont typeface="StarSymbol"/>
-              <a:buAutoNum type="arabicParenR"/>
-            </a:pPr>
-            <a:r>
-              <a:rPr b="0" lang="en-US" sz="1400" spc="-1" strike="noStrike">
-                <a:solidFill>
-                  <a:srgbClr val="0000ff"/>
-                </a:solidFill>
-                <a:latin typeface="Arial"/>
-                <a:ea typeface="DejaVu Sans"/>
-              </a:rPr>
-              <a:t>Ghost Imaging</a:t>
-            </a:r>
-            <a:endParaRPr b="0" lang="en-US" sz="1400" spc="-1" strike="noStrike">
-              <a:latin typeface="Arial"/>
-            </a:endParaRPr>
-          </a:p>
-          <a:p>
-            <a:pPr marL="216000" indent="-216000">
-              <a:lnSpc>
-                <a:spcPct val="100000"/>
-              </a:lnSpc>
-              <a:buClr>
-                <a:srgbClr val="0000ff"/>
-              </a:buClr>
-              <a:buFont typeface="StarSymbol"/>
-              <a:buAutoNum type="arabicParenR"/>
-            </a:pPr>
-            <a:r>
-              <a:rPr b="0" lang="en-US" sz="1400" spc="-1" strike="noStrike">
-                <a:solidFill>
-                  <a:srgbClr val="0000ff"/>
-                </a:solidFill>
-                <a:latin typeface="Arial"/>
-                <a:ea typeface="DejaVu Sans"/>
-              </a:rPr>
-              <a:t>Ghost Spectroscopy</a:t>
-            </a:r>
-            <a:endParaRPr b="0" lang="en-US" sz="1400" spc="-1" strike="noStrike">
-              <a:latin typeface="Arial"/>
-            </a:endParaRPr>
-          </a:p>
-          <a:p>
-            <a:pPr marL="216000" indent="-216000">
-              <a:lnSpc>
-                <a:spcPct val="100000"/>
-              </a:lnSpc>
-              <a:buClr>
-                <a:srgbClr val="0000ff"/>
-              </a:buClr>
-              <a:buFont typeface="StarSymbol"/>
-              <a:buAutoNum type="arabicParenR"/>
-            </a:pPr>
-            <a:r>
-              <a:rPr b="0" lang="en-US" sz="1400" spc="-1" strike="noStrike">
-                <a:solidFill>
-                  <a:srgbClr val="0000ff"/>
-                </a:solidFill>
-                <a:latin typeface="Arial"/>
-                <a:ea typeface="DejaVu Sans"/>
-              </a:rPr>
-              <a:t>Non-Line-of-Sight Imaging</a:t>
-            </a:r>
-            <a:endParaRPr b="0" lang="en-US" sz="1400" spc="-1" strike="noStrike">
-              <a:latin typeface="Arial"/>
-            </a:endParaRPr>
-          </a:p>
-          <a:p>
-            <a:pPr marL="216000" indent="-216000">
-              <a:lnSpc>
-                <a:spcPct val="100000"/>
-              </a:lnSpc>
-              <a:buClr>
-                <a:srgbClr val="0000ff"/>
-              </a:buClr>
-              <a:buFont typeface="StarSymbol"/>
-              <a:buAutoNum type="arabicParenR"/>
-            </a:pPr>
-            <a:r>
-              <a:rPr b="0" lang="en-US" sz="1400" spc="-1" strike="noStrike">
-                <a:solidFill>
-                  <a:srgbClr val="0000ff"/>
-                </a:solidFill>
-                <a:latin typeface="Arial"/>
-                <a:ea typeface="DejaVu Sans"/>
-              </a:rPr>
               <a:t>Quantum Squeezing</a:t>
             </a:r>
             <a:endParaRPr b="0" lang="en-US" sz="1400" spc="-1" strike="noStrike">
@@ -6984,7 +7013,7 @@
             </a:endParaRPr>
           </a:p>
           <a:p>
-            <a:pPr marL="216000" indent="-216000">
+            <a:pPr marL="216000" indent="-215640">
               <a:lnSpc>
                 <a:spcPct val="100000"/>
               </a:lnSpc>

</xml_diff>